<commit_message>
Kleine Einstiegsdemo zur Spezifität hinzugefügt.
</commit_message>
<xml_diff>
--- a/htmlSchulung.pptx
+++ b/htmlSchulung.pptx
@@ -328,7 +328,7 @@
           <a:p>
             <a:fld id="{BE2D71F2-CD9B-7C46-8D66-54734C07EE34}" type="datetimeFigureOut">
               <a:rPr lang="de-DE" smtClean="0"/>
-              <a:t>27.03.19</a:t>
+              <a:t>29.03.19</a:t>
             </a:fld>
             <a:endParaRPr lang="de-DE"/>
           </a:p>
@@ -461,7 +461,7 @@
           <a:p>
             <a:fld id="{60940F8C-0819-D64A-BC61-6EB4B2E2912A}" type="slidenum">
               <a:rPr lang="de-DE" smtClean="0"/>
-              <a:t>‹#›</a:t>
+              <a:t>‹Nr.›</a:t>
             </a:fld>
             <a:endParaRPr lang="de-DE"/>
           </a:p>
@@ -1516,7 +1516,7 @@
           <a:p>
             <a:fld id="{97F8442F-7EFF-D846-8D33-E60C8BAB8488}" type="datetimeFigureOut">
               <a:rPr lang="de-DE" smtClean="0"/>
-              <a:t>27.03.19</a:t>
+              <a:t>29.03.19</a:t>
             </a:fld>
             <a:endParaRPr lang="de-DE"/>
           </a:p>
@@ -1563,7 +1563,7 @@
           <a:p>
             <a:fld id="{D90341C6-B83F-F944-B0DF-A5D91789E42C}" type="slidenum">
               <a:rPr lang="de-DE" smtClean="0"/>
-              <a:t>‹#›</a:t>
+              <a:t>‹Nr.›</a:t>
             </a:fld>
             <a:endParaRPr lang="de-DE"/>
           </a:p>
@@ -1935,7 +1935,7 @@
           <a:p>
             <a:fld id="{97F8442F-7EFF-D846-8D33-E60C8BAB8488}" type="datetimeFigureOut">
               <a:rPr lang="de-DE" smtClean="0"/>
-              <a:t>27.03.19</a:t>
+              <a:t>29.03.19</a:t>
             </a:fld>
             <a:endParaRPr lang="de-DE"/>
           </a:p>
@@ -1982,7 +1982,7 @@
           <a:p>
             <a:fld id="{D90341C6-B83F-F944-B0DF-A5D91789E42C}" type="slidenum">
               <a:rPr lang="de-DE" smtClean="0"/>
-              <a:t>‹#›</a:t>
+              <a:t>‹Nr.›</a:t>
             </a:fld>
             <a:endParaRPr lang="de-DE"/>
           </a:p>
@@ -2276,7 +2276,7 @@
           <a:p>
             <a:fld id="{97F8442F-7EFF-D846-8D33-E60C8BAB8488}" type="datetimeFigureOut">
               <a:rPr lang="de-DE" smtClean="0"/>
-              <a:t>27.03.19</a:t>
+              <a:t>29.03.19</a:t>
             </a:fld>
             <a:endParaRPr lang="de-DE"/>
           </a:p>
@@ -2323,7 +2323,7 @@
           <a:p>
             <a:fld id="{D90341C6-B83F-F944-B0DF-A5D91789E42C}" type="slidenum">
               <a:rPr lang="de-DE" smtClean="0"/>
-              <a:t>‹#›</a:t>
+              <a:t>‹Nr.›</a:t>
             </a:fld>
             <a:endParaRPr lang="de-DE"/>
           </a:p>
@@ -2691,7 +2691,7 @@
           <a:p>
             <a:fld id="{97F8442F-7EFF-D846-8D33-E60C8BAB8488}" type="datetimeFigureOut">
               <a:rPr lang="de-DE" smtClean="0"/>
-              <a:t>27.03.19</a:t>
+              <a:t>29.03.19</a:t>
             </a:fld>
             <a:endParaRPr lang="de-DE"/>
           </a:p>
@@ -2738,7 +2738,7 @@
           <a:p>
             <a:fld id="{D90341C6-B83F-F944-B0DF-A5D91789E42C}" type="slidenum">
               <a:rPr lang="de-DE" smtClean="0"/>
-              <a:t>‹#›</a:t>
+              <a:t>‹Nr.›</a:t>
             </a:fld>
             <a:endParaRPr lang="de-DE"/>
           </a:p>
@@ -3264,7 +3264,7 @@
           <a:p>
             <a:fld id="{97F8442F-7EFF-D846-8D33-E60C8BAB8488}" type="datetimeFigureOut">
               <a:rPr lang="de-DE" smtClean="0"/>
-              <a:t>27.03.19</a:t>
+              <a:t>29.03.19</a:t>
             </a:fld>
             <a:endParaRPr lang="de-DE"/>
           </a:p>
@@ -3311,7 +3311,7 @@
           <a:p>
             <a:fld id="{D90341C6-B83F-F944-B0DF-A5D91789E42C}" type="slidenum">
               <a:rPr lang="de-DE" smtClean="0"/>
-              <a:t>‹#›</a:t>
+              <a:t>‹Nr.›</a:t>
             </a:fld>
             <a:endParaRPr lang="de-DE"/>
           </a:p>
@@ -3975,7 +3975,7 @@
           <a:p>
             <a:fld id="{97F8442F-7EFF-D846-8D33-E60C8BAB8488}" type="datetimeFigureOut">
               <a:rPr lang="de-DE" smtClean="0"/>
-              <a:t>27.03.19</a:t>
+              <a:t>29.03.19</a:t>
             </a:fld>
             <a:endParaRPr lang="de-DE"/>
           </a:p>
@@ -4017,7 +4017,7 @@
           <a:p>
             <a:fld id="{D90341C6-B83F-F944-B0DF-A5D91789E42C}" type="slidenum">
               <a:rPr lang="de-DE" smtClean="0"/>
-              <a:t>‹#›</a:t>
+              <a:t>‹Nr.›</a:t>
             </a:fld>
             <a:endParaRPr lang="de-DE"/>
           </a:p>
@@ -4918,7 +4918,7 @@
           <a:p>
             <a:fld id="{97F8442F-7EFF-D846-8D33-E60C8BAB8488}" type="datetimeFigureOut">
               <a:rPr lang="de-DE" smtClean="0"/>
-              <a:t>27.03.19</a:t>
+              <a:t>29.03.19</a:t>
             </a:fld>
             <a:endParaRPr lang="de-DE"/>
           </a:p>
@@ -4960,7 +4960,7 @@
           <a:p>
             <a:fld id="{D90341C6-B83F-F944-B0DF-A5D91789E42C}" type="slidenum">
               <a:rPr lang="de-DE" smtClean="0"/>
-              <a:t>‹#›</a:t>
+              <a:t>‹Nr.›</a:t>
             </a:fld>
             <a:endParaRPr lang="de-DE"/>
           </a:p>
@@ -5207,7 +5207,7 @@
           <a:p>
             <a:fld id="{97F8442F-7EFF-D846-8D33-E60C8BAB8488}" type="datetimeFigureOut">
               <a:rPr lang="de-DE" smtClean="0"/>
-              <a:t>27.03.19</a:t>
+              <a:t>29.03.19</a:t>
             </a:fld>
             <a:endParaRPr lang="de-DE"/>
           </a:p>
@@ -5249,7 +5249,7 @@
           <a:p>
             <a:fld id="{D90341C6-B83F-F944-B0DF-A5D91789E42C}" type="slidenum">
               <a:rPr lang="de-DE" smtClean="0"/>
-              <a:t>‹#›</a:t>
+              <a:t>‹Nr.›</a:t>
             </a:fld>
             <a:endParaRPr lang="de-DE"/>
           </a:p>
@@ -5447,7 +5447,7 @@
           <a:p>
             <a:fld id="{97F8442F-7EFF-D846-8D33-E60C8BAB8488}" type="datetimeFigureOut">
               <a:rPr lang="de-DE" smtClean="0"/>
-              <a:t>27.03.19</a:t>
+              <a:t>29.03.19</a:t>
             </a:fld>
             <a:endParaRPr lang="de-DE"/>
           </a:p>
@@ -5503,7 +5503,7 @@
           <a:p>
             <a:fld id="{D90341C6-B83F-F944-B0DF-A5D91789E42C}" type="slidenum">
               <a:rPr lang="de-DE" smtClean="0"/>
-              <a:t>‹#›</a:t>
+              <a:t>‹Nr.›</a:t>
             </a:fld>
             <a:endParaRPr lang="de-DE"/>
           </a:p>
@@ -5746,7 +5746,7 @@
           <a:p>
             <a:fld id="{97F8442F-7EFF-D846-8D33-E60C8BAB8488}" type="datetimeFigureOut">
               <a:rPr lang="de-DE" smtClean="0"/>
-              <a:t>27.03.19</a:t>
+              <a:t>29.03.19</a:t>
             </a:fld>
             <a:endParaRPr lang="de-DE"/>
           </a:p>
@@ -5788,7 +5788,7 @@
           <a:p>
             <a:fld id="{D90341C6-B83F-F944-B0DF-A5D91789E42C}" type="slidenum">
               <a:rPr lang="de-DE" smtClean="0"/>
-              <a:t>‹#›</a:t>
+              <a:t>‹Nr.›</a:t>
             </a:fld>
             <a:endParaRPr lang="de-DE"/>
           </a:p>
@@ -6140,7 +6140,7 @@
           <a:p>
             <a:fld id="{97F8442F-7EFF-D846-8D33-E60C8BAB8488}" type="datetimeFigureOut">
               <a:rPr lang="de-DE" smtClean="0"/>
-              <a:t>27.03.19</a:t>
+              <a:t>29.03.19</a:t>
             </a:fld>
             <a:endParaRPr lang="de-DE"/>
           </a:p>
@@ -6187,7 +6187,7 @@
           <a:p>
             <a:fld id="{D90341C6-B83F-F944-B0DF-A5D91789E42C}" type="slidenum">
               <a:rPr lang="de-DE" smtClean="0"/>
-              <a:t>‹#›</a:t>
+              <a:t>‹Nr.›</a:t>
             </a:fld>
             <a:endParaRPr lang="de-DE"/>
           </a:p>
@@ -6468,7 +6468,7 @@
           <a:p>
             <a:fld id="{97F8442F-7EFF-D846-8D33-E60C8BAB8488}" type="datetimeFigureOut">
               <a:rPr lang="de-DE" smtClean="0"/>
-              <a:t>27.03.19</a:t>
+              <a:t>29.03.19</a:t>
             </a:fld>
             <a:endParaRPr lang="de-DE"/>
           </a:p>
@@ -6510,7 +6510,7 @@
           <a:p>
             <a:fld id="{D90341C6-B83F-F944-B0DF-A5D91789E42C}" type="slidenum">
               <a:rPr lang="de-DE" smtClean="0"/>
-              <a:t>‹#›</a:t>
+              <a:t>‹Nr.›</a:t>
             </a:fld>
             <a:endParaRPr lang="de-DE"/>
           </a:p>
@@ -6936,7 +6936,7 @@
           <a:p>
             <a:fld id="{97F8442F-7EFF-D846-8D33-E60C8BAB8488}" type="datetimeFigureOut">
               <a:rPr lang="de-DE" smtClean="0"/>
-              <a:t>27.03.19</a:t>
+              <a:t>29.03.19</a:t>
             </a:fld>
             <a:endParaRPr lang="de-DE"/>
           </a:p>
@@ -6978,7 +6978,7 @@
           <a:p>
             <a:fld id="{D90341C6-B83F-F944-B0DF-A5D91789E42C}" type="slidenum">
               <a:rPr lang="de-DE" smtClean="0"/>
-              <a:t>‹#›</a:t>
+              <a:t>‹Nr.›</a:t>
             </a:fld>
             <a:endParaRPr lang="de-DE"/>
           </a:p>
@@ -7193,7 +7193,7 @@
           <a:p>
             <a:fld id="{97F8442F-7EFF-D846-8D33-E60C8BAB8488}" type="datetimeFigureOut">
               <a:rPr lang="de-DE" smtClean="0"/>
-              <a:t>27.03.19</a:t>
+              <a:t>29.03.19</a:t>
             </a:fld>
             <a:endParaRPr lang="de-DE"/>
           </a:p>
@@ -7235,7 +7235,7 @@
           <a:p>
             <a:fld id="{D90341C6-B83F-F944-B0DF-A5D91789E42C}" type="slidenum">
               <a:rPr lang="de-DE" smtClean="0"/>
-              <a:t>‹#›</a:t>
+              <a:t>‹Nr.›</a:t>
             </a:fld>
             <a:endParaRPr lang="de-DE"/>
           </a:p>
@@ -7356,7 +7356,7 @@
           <a:p>
             <a:fld id="{97F8442F-7EFF-D846-8D33-E60C8BAB8488}" type="datetimeFigureOut">
               <a:rPr lang="de-DE" smtClean="0"/>
-              <a:t>27.03.19</a:t>
+              <a:t>29.03.19</a:t>
             </a:fld>
             <a:endParaRPr lang="de-DE"/>
           </a:p>
@@ -7398,7 +7398,7 @@
           <a:p>
             <a:fld id="{D90341C6-B83F-F944-B0DF-A5D91789E42C}" type="slidenum">
               <a:rPr lang="de-DE" smtClean="0"/>
-              <a:t>‹#›</a:t>
+              <a:t>‹Nr.›</a:t>
             </a:fld>
             <a:endParaRPr lang="de-DE"/>
           </a:p>
@@ -7727,7 +7727,7 @@
           <a:p>
             <a:fld id="{97F8442F-7EFF-D846-8D33-E60C8BAB8488}" type="datetimeFigureOut">
               <a:rPr lang="de-DE" smtClean="0"/>
-              <a:t>27.03.19</a:t>
+              <a:t>29.03.19</a:t>
             </a:fld>
             <a:endParaRPr lang="de-DE"/>
           </a:p>
@@ -7769,7 +7769,7 @@
           <a:p>
             <a:fld id="{D90341C6-B83F-F944-B0DF-A5D91789E42C}" type="slidenum">
               <a:rPr lang="de-DE" smtClean="0"/>
-              <a:t>‹#›</a:t>
+              <a:t>‹Nr.›</a:t>
             </a:fld>
             <a:endParaRPr lang="de-DE"/>
           </a:p>
@@ -8141,7 +8141,7 @@
           <a:p>
             <a:fld id="{97F8442F-7EFF-D846-8D33-E60C8BAB8488}" type="datetimeFigureOut">
               <a:rPr lang="de-DE" smtClean="0"/>
-              <a:t>27.03.19</a:t>
+              <a:t>29.03.19</a:t>
             </a:fld>
             <a:endParaRPr lang="de-DE"/>
           </a:p>
@@ -8183,7 +8183,7 @@
           <a:p>
             <a:fld id="{D90341C6-B83F-F944-B0DF-A5D91789E42C}" type="slidenum">
               <a:rPr lang="de-DE" smtClean="0"/>
-              <a:t>‹#›</a:t>
+              <a:t>‹Nr.›</a:t>
             </a:fld>
             <a:endParaRPr lang="de-DE"/>
           </a:p>
@@ -8361,7 +8361,7 @@
           <a:p>
             <a:fld id="{97F8442F-7EFF-D846-8D33-E60C8BAB8488}" type="datetimeFigureOut">
               <a:rPr lang="de-DE" smtClean="0"/>
-              <a:t>27.03.19</a:t>
+              <a:t>29.03.19</a:t>
             </a:fld>
             <a:endParaRPr lang="de-DE"/>
           </a:p>
@@ -8439,7 +8439,7 @@
           <a:p>
             <a:fld id="{D90341C6-B83F-F944-B0DF-A5D91789E42C}" type="slidenum">
               <a:rPr lang="de-DE" smtClean="0"/>
-              <a:t>‹#›</a:t>
+              <a:t>‹Nr.›</a:t>
             </a:fld>
             <a:endParaRPr lang="de-DE"/>
           </a:p>
@@ -24361,17 +24361,617 @@
             </a:r>
             <a:r>
               <a:rPr lang="de-CH" dirty="0"/>
-              <a:t> und die Schreib-Reihenfolge ergibt sich, welche CSS Regeln auf das Element angewendet werden. </a:t>
-            </a:r>
-          </a:p>
+              <a:t> und die Schreib-Reihenfolge ergibt sich, welche CSS Regeln auf das Element angewendet werden.</a:t>
+            </a:r>
+          </a:p>
+          <a:p>
+            <a:endParaRPr lang="de-DE" dirty="0"/>
+          </a:p>
+        </p:txBody>
+      </p:sp>
+      <p:sp>
+        <p:nvSpPr>
+          <p:cNvPr id="4" name="Rechteck 11">
+            <a:extLst>
+              <a:ext uri="{FF2B5EF4-FFF2-40B4-BE49-F238E27FC236}">
+                <a16:creationId xmlns:a16="http://schemas.microsoft.com/office/drawing/2014/main" id="{5D604810-5E03-544C-9951-0B1E1F9C2F48}"/>
+              </a:ext>
+            </a:extLst>
+          </p:cNvPr>
+          <p:cNvSpPr txBox="1">
+            <a:spLocks/>
+          </p:cNvSpPr>
+          <p:nvPr/>
+        </p:nvSpPr>
+        <p:spPr>
+          <a:xfrm>
+            <a:off x="4908983" y="4289275"/>
+            <a:ext cx="3453687" cy="2149621"/>
+          </a:xfrm>
+          <a:prstGeom prst="rect">
+            <a:avLst/>
+          </a:prstGeom>
+        </p:spPr>
+        <p:style>
+          <a:lnRef idx="2">
+            <a:schemeClr val="accent6"/>
+          </a:lnRef>
+          <a:fillRef idx="1">
+            <a:schemeClr val="lt1"/>
+          </a:fillRef>
+          <a:effectRef idx="0">
+            <a:schemeClr val="accent6"/>
+          </a:effectRef>
+          <a:fontRef idx="minor">
+            <a:schemeClr val="dk1"/>
+          </a:fontRef>
+        </p:style>
+        <p:txBody>
+          <a:bodyPr vert="horz" lIns="91440" tIns="45720" rIns="91440" bIns="45720" rtlCol="0" anchor="t">
+            <a:noAutofit/>
+          </a:bodyPr>
+          <a:lstStyle>
+            <a:lvl1pPr marL="228600" indent="-228600" algn="l" defTabSz="914400" rtl="0" eaLnBrk="1" latinLnBrk="0" hangingPunct="1">
+              <a:lnSpc>
+                <a:spcPct val="90000"/>
+              </a:lnSpc>
+              <a:spcBef>
+                <a:spcPts val="1000"/>
+              </a:spcBef>
+              <a:buFont typeface="Arial" panose="020B0604020202020204" pitchFamily="34" charset="0"/>
+              <a:buChar char="•"/>
+              <a:defRPr sz="2400" kern="1200">
+                <a:solidFill>
+                  <a:schemeClr val="dk1"/>
+                </a:solidFill>
+                <a:latin typeface="+mn-lt"/>
+                <a:ea typeface="+mn-ea"/>
+                <a:cs typeface="+mn-cs"/>
+              </a:defRPr>
+            </a:lvl1pPr>
+            <a:lvl2pPr marL="685800" indent="-228600" algn="l" defTabSz="914400" rtl="0" eaLnBrk="1" latinLnBrk="0" hangingPunct="1">
+              <a:lnSpc>
+                <a:spcPct val="90000"/>
+              </a:lnSpc>
+              <a:spcBef>
+                <a:spcPts val="500"/>
+              </a:spcBef>
+              <a:buFont typeface="Arial" panose="020B0604020202020204" pitchFamily="34" charset="0"/>
+              <a:buChar char="•"/>
+              <a:defRPr sz="2000" kern="1200">
+                <a:solidFill>
+                  <a:schemeClr val="dk1"/>
+                </a:solidFill>
+                <a:latin typeface="+mn-lt"/>
+                <a:ea typeface="+mn-ea"/>
+                <a:cs typeface="+mn-cs"/>
+              </a:defRPr>
+            </a:lvl2pPr>
+            <a:lvl3pPr marL="1143000" indent="-228600" algn="l" defTabSz="914400" rtl="0" eaLnBrk="1" latinLnBrk="0" hangingPunct="1">
+              <a:lnSpc>
+                <a:spcPct val="90000"/>
+              </a:lnSpc>
+              <a:spcBef>
+                <a:spcPts val="500"/>
+              </a:spcBef>
+              <a:buFont typeface="Arial" panose="020B0604020202020204" pitchFamily="34" charset="0"/>
+              <a:buChar char="•"/>
+              <a:defRPr sz="1800" kern="1200">
+                <a:solidFill>
+                  <a:schemeClr val="dk1"/>
+                </a:solidFill>
+                <a:latin typeface="+mn-lt"/>
+                <a:ea typeface="+mn-ea"/>
+                <a:cs typeface="+mn-cs"/>
+              </a:defRPr>
+            </a:lvl3pPr>
+            <a:lvl4pPr marL="1600200" indent="-228600" algn="l" defTabSz="914400" rtl="0" eaLnBrk="1" latinLnBrk="0" hangingPunct="1">
+              <a:lnSpc>
+                <a:spcPct val="90000"/>
+              </a:lnSpc>
+              <a:spcBef>
+                <a:spcPts val="500"/>
+              </a:spcBef>
+              <a:buFont typeface="Arial" panose="020B0604020202020204" pitchFamily="34" charset="0"/>
+              <a:buChar char="•"/>
+              <a:defRPr sz="1600" kern="1200">
+                <a:solidFill>
+                  <a:schemeClr val="dk1"/>
+                </a:solidFill>
+                <a:latin typeface="+mn-lt"/>
+                <a:ea typeface="+mn-ea"/>
+                <a:cs typeface="+mn-cs"/>
+              </a:defRPr>
+            </a:lvl4pPr>
+            <a:lvl5pPr marL="2057400" indent="-228600" algn="l" defTabSz="914400" rtl="0" eaLnBrk="1" latinLnBrk="0" hangingPunct="1">
+              <a:lnSpc>
+                <a:spcPct val="90000"/>
+              </a:lnSpc>
+              <a:spcBef>
+                <a:spcPts val="500"/>
+              </a:spcBef>
+              <a:buFont typeface="Arial" panose="020B0604020202020204" pitchFamily="34" charset="0"/>
+              <a:buChar char="•"/>
+              <a:defRPr sz="1600" kern="1200">
+                <a:solidFill>
+                  <a:schemeClr val="dk1"/>
+                </a:solidFill>
+                <a:latin typeface="+mn-lt"/>
+                <a:ea typeface="+mn-ea"/>
+                <a:cs typeface="+mn-cs"/>
+              </a:defRPr>
+            </a:lvl5pPr>
+            <a:lvl6pPr marL="2514600" indent="-228600" algn="l" defTabSz="914400" rtl="0" eaLnBrk="1" latinLnBrk="0" hangingPunct="1">
+              <a:lnSpc>
+                <a:spcPct val="90000"/>
+              </a:lnSpc>
+              <a:spcBef>
+                <a:spcPts val="500"/>
+              </a:spcBef>
+              <a:buFont typeface="Arial" panose="020B0604020202020204" pitchFamily="34" charset="0"/>
+              <a:buChar char="•"/>
+              <a:defRPr sz="1400" kern="1200">
+                <a:solidFill>
+                  <a:schemeClr val="dk1"/>
+                </a:solidFill>
+                <a:latin typeface="+mn-lt"/>
+                <a:ea typeface="+mn-ea"/>
+                <a:cs typeface="+mn-cs"/>
+              </a:defRPr>
+            </a:lvl6pPr>
+            <a:lvl7pPr marL="2971800" indent="-228600" algn="l" defTabSz="914400" rtl="0" eaLnBrk="1" latinLnBrk="0" hangingPunct="1">
+              <a:lnSpc>
+                <a:spcPct val="90000"/>
+              </a:lnSpc>
+              <a:spcBef>
+                <a:spcPts val="500"/>
+              </a:spcBef>
+              <a:buFont typeface="Arial" panose="020B0604020202020204" pitchFamily="34" charset="0"/>
+              <a:buChar char="•"/>
+              <a:defRPr sz="1400" kern="1200">
+                <a:solidFill>
+                  <a:schemeClr val="dk1"/>
+                </a:solidFill>
+                <a:latin typeface="+mn-lt"/>
+                <a:ea typeface="+mn-ea"/>
+                <a:cs typeface="+mn-cs"/>
+              </a:defRPr>
+            </a:lvl7pPr>
+            <a:lvl8pPr marL="3429000" indent="-228600" algn="l" defTabSz="914400" rtl="0" eaLnBrk="1" latinLnBrk="0" hangingPunct="1">
+              <a:lnSpc>
+                <a:spcPct val="90000"/>
+              </a:lnSpc>
+              <a:spcBef>
+                <a:spcPts val="500"/>
+              </a:spcBef>
+              <a:buFont typeface="Arial" panose="020B0604020202020204" pitchFamily="34" charset="0"/>
+              <a:buChar char="•"/>
+              <a:defRPr sz="1400" kern="1200">
+                <a:solidFill>
+                  <a:schemeClr val="dk1"/>
+                </a:solidFill>
+                <a:latin typeface="+mn-lt"/>
+                <a:ea typeface="+mn-ea"/>
+                <a:cs typeface="+mn-cs"/>
+              </a:defRPr>
+            </a:lvl8pPr>
+            <a:lvl9pPr marL="3886200" indent="-228600" algn="l" defTabSz="914400" rtl="0" eaLnBrk="1" latinLnBrk="0" hangingPunct="1">
+              <a:lnSpc>
+                <a:spcPct val="90000"/>
+              </a:lnSpc>
+              <a:spcBef>
+                <a:spcPts val="500"/>
+              </a:spcBef>
+              <a:buFont typeface="Arial" panose="020B0604020202020204" pitchFamily="34" charset="0"/>
+              <a:buChar char="•"/>
+              <a:defRPr sz="1400" kern="1200">
+                <a:solidFill>
+                  <a:schemeClr val="dk1"/>
+                </a:solidFill>
+                <a:latin typeface="+mn-lt"/>
+                <a:ea typeface="+mn-ea"/>
+                <a:cs typeface="+mn-cs"/>
+              </a:defRPr>
+            </a:lvl9pPr>
+          </a:lstStyle>
           <a:p>
             <a:pPr marL="0" indent="0">
               <a:buNone/>
             </a:pPr>
-            <a:endParaRPr lang="de-CH" dirty="0"/>
-          </a:p>
-          <a:p>
-            <a:endParaRPr lang="de-DE" dirty="0"/>
+            <a:r>
+              <a:rPr lang="de-CH" sz="1800" dirty="0">
+                <a:latin typeface="Arial" panose="020B0604020202020204" pitchFamily="34" charset="0"/>
+                <a:cs typeface="Arial" panose="020B0604020202020204" pitchFamily="34" charset="0"/>
+              </a:rPr>
+              <a:t>&lt;p </a:t>
+            </a:r>
+            <a:r>
+              <a:rPr lang="de-CH" sz="1800" dirty="0" err="1">
+                <a:latin typeface="Arial" panose="020B0604020202020204" pitchFamily="34" charset="0"/>
+                <a:cs typeface="Arial" panose="020B0604020202020204" pitchFamily="34" charset="0"/>
+              </a:rPr>
+              <a:t>id</a:t>
+            </a:r>
+            <a:r>
+              <a:rPr lang="de-CH" sz="1800" dirty="0">
+                <a:latin typeface="Arial" panose="020B0604020202020204" pitchFamily="34" charset="0"/>
+                <a:cs typeface="Arial" panose="020B0604020202020204" pitchFamily="34" charset="0"/>
+              </a:rPr>
+              <a:t>="</a:t>
+            </a:r>
+            <a:r>
+              <a:rPr lang="de-CH" sz="1800" dirty="0" err="1">
+                <a:latin typeface="Arial" panose="020B0604020202020204" pitchFamily="34" charset="0"/>
+                <a:cs typeface="Arial" panose="020B0604020202020204" pitchFamily="34" charset="0"/>
+              </a:rPr>
+              <a:t>intro</a:t>
+            </a:r>
+            <a:r>
+              <a:rPr lang="de-CH" sz="1800" dirty="0">
+                <a:latin typeface="Arial" panose="020B0604020202020204" pitchFamily="34" charset="0"/>
+                <a:cs typeface="Arial" panose="020B0604020202020204" pitchFamily="34" charset="0"/>
+              </a:rPr>
+              <a:t>" </a:t>
+            </a:r>
+            <a:r>
+              <a:rPr lang="de-CH" sz="1800" dirty="0" err="1">
+                <a:latin typeface="Arial" panose="020B0604020202020204" pitchFamily="34" charset="0"/>
+                <a:cs typeface="Arial" panose="020B0604020202020204" pitchFamily="34" charset="0"/>
+              </a:rPr>
+              <a:t>class</a:t>
+            </a:r>
+            <a:r>
+              <a:rPr lang="de-CH" sz="1800" dirty="0">
+                <a:latin typeface="Arial" panose="020B0604020202020204" pitchFamily="34" charset="0"/>
+                <a:cs typeface="Arial" panose="020B0604020202020204" pitchFamily="34" charset="0"/>
+              </a:rPr>
+              <a:t>="</a:t>
+            </a:r>
+            <a:r>
+              <a:rPr lang="de-CH" sz="1800" dirty="0" err="1">
+                <a:latin typeface="Arial" panose="020B0604020202020204" pitchFamily="34" charset="0"/>
+                <a:cs typeface="Arial" panose="020B0604020202020204" pitchFamily="34" charset="0"/>
+              </a:rPr>
+              <a:t>excerpt</a:t>
+            </a:r>
+            <a:r>
+              <a:rPr lang="de-CH" sz="1800" dirty="0">
+                <a:latin typeface="Arial" panose="020B0604020202020204" pitchFamily="34" charset="0"/>
+                <a:cs typeface="Arial" panose="020B0604020202020204" pitchFamily="34" charset="0"/>
+              </a:rPr>
+              <a:t>"&gt;</a:t>
+            </a:r>
+            <a:br>
+              <a:rPr lang="de-CH" sz="1800" dirty="0">
+                <a:latin typeface="Arial" panose="020B0604020202020204" pitchFamily="34" charset="0"/>
+                <a:cs typeface="Arial" panose="020B0604020202020204" pitchFamily="34" charset="0"/>
+              </a:rPr>
+            </a:br>
+            <a:r>
+              <a:rPr lang="de-CH" sz="1800" dirty="0">
+                <a:latin typeface="Arial" panose="020B0604020202020204" pitchFamily="34" charset="0"/>
+                <a:cs typeface="Arial" panose="020B0604020202020204" pitchFamily="34" charset="0"/>
+              </a:rPr>
+              <a:t>    </a:t>
+            </a:r>
+            <a:r>
+              <a:rPr lang="de-CH" sz="1800" dirty="0" err="1">
+                <a:latin typeface="Arial" panose="020B0604020202020204" pitchFamily="34" charset="0"/>
+                <a:cs typeface="Arial" panose="020B0604020202020204" pitchFamily="34" charset="0"/>
+              </a:rPr>
+              <a:t>Lorem</a:t>
+            </a:r>
+            <a:r>
+              <a:rPr lang="de-CH" sz="1800" dirty="0">
+                <a:latin typeface="Arial" panose="020B0604020202020204" pitchFamily="34" charset="0"/>
+                <a:cs typeface="Arial" panose="020B0604020202020204" pitchFamily="34" charset="0"/>
+              </a:rPr>
+              <a:t> </a:t>
+            </a:r>
+            <a:r>
+              <a:rPr lang="de-CH" sz="1800" dirty="0" err="1">
+                <a:latin typeface="Arial" panose="020B0604020202020204" pitchFamily="34" charset="0"/>
+                <a:cs typeface="Arial" panose="020B0604020202020204" pitchFamily="34" charset="0"/>
+              </a:rPr>
+              <a:t>ipsum</a:t>
+            </a:r>
+            <a:r>
+              <a:rPr lang="de-CH" sz="1800" dirty="0">
+                <a:latin typeface="Arial" panose="020B0604020202020204" pitchFamily="34" charset="0"/>
+                <a:cs typeface="Arial" panose="020B0604020202020204" pitchFamily="34" charset="0"/>
+              </a:rPr>
+              <a:t> </a:t>
+            </a:r>
+            <a:r>
+              <a:rPr lang="de-CH" sz="1800" dirty="0" err="1">
+                <a:latin typeface="Arial" panose="020B0604020202020204" pitchFamily="34" charset="0"/>
+                <a:cs typeface="Arial" panose="020B0604020202020204" pitchFamily="34" charset="0"/>
+              </a:rPr>
+              <a:t>dolor</a:t>
+            </a:r>
+            <a:r>
+              <a:rPr lang="de-CH" sz="1800" dirty="0">
+                <a:latin typeface="Arial" panose="020B0604020202020204" pitchFamily="34" charset="0"/>
+                <a:cs typeface="Arial" panose="020B0604020202020204" pitchFamily="34" charset="0"/>
+              </a:rPr>
+              <a:t> </a:t>
+            </a:r>
+            <a:r>
+              <a:rPr lang="de-CH" sz="1800" dirty="0" err="1">
+                <a:latin typeface="Arial" panose="020B0604020202020204" pitchFamily="34" charset="0"/>
+                <a:cs typeface="Arial" panose="020B0604020202020204" pitchFamily="34" charset="0"/>
+              </a:rPr>
+              <a:t>sit</a:t>
+            </a:r>
+            <a:r>
+              <a:rPr lang="de-CH" sz="1800" dirty="0">
+                <a:latin typeface="Arial" panose="020B0604020202020204" pitchFamily="34" charset="0"/>
+                <a:cs typeface="Arial" panose="020B0604020202020204" pitchFamily="34" charset="0"/>
+              </a:rPr>
+              <a:t> </a:t>
+            </a:r>
+            <a:r>
+              <a:rPr lang="de-CH" sz="1800" dirty="0" err="1">
+                <a:latin typeface="Arial" panose="020B0604020202020204" pitchFamily="34" charset="0"/>
+                <a:cs typeface="Arial" panose="020B0604020202020204" pitchFamily="34" charset="0"/>
+              </a:rPr>
+              <a:t>amet</a:t>
+            </a:r>
+            <a:br>
+              <a:rPr lang="de-CH" sz="1800" dirty="0">
+                <a:latin typeface="Arial" panose="020B0604020202020204" pitchFamily="34" charset="0"/>
+                <a:cs typeface="Arial" panose="020B0604020202020204" pitchFamily="34" charset="0"/>
+              </a:rPr>
+            </a:br>
+            <a:r>
+              <a:rPr lang="de-CH" sz="1800" dirty="0">
+                <a:latin typeface="Arial" panose="020B0604020202020204" pitchFamily="34" charset="0"/>
+                <a:cs typeface="Arial" panose="020B0604020202020204" pitchFamily="34" charset="0"/>
+              </a:rPr>
+              <a:t>&lt;/p&gt;</a:t>
+            </a:r>
+            <a:br>
+              <a:rPr lang="de-CH" sz="1800" dirty="0">
+                <a:latin typeface="Arial" panose="020B0604020202020204" pitchFamily="34" charset="0"/>
+                <a:cs typeface="Arial" panose="020B0604020202020204" pitchFamily="34" charset="0"/>
+              </a:rPr>
+            </a:br>
+            <a:br>
+              <a:rPr lang="de-CH" sz="1800" dirty="0">
+                <a:latin typeface="Arial" panose="020B0604020202020204" pitchFamily="34" charset="0"/>
+                <a:cs typeface="Arial" panose="020B0604020202020204" pitchFamily="34" charset="0"/>
+              </a:rPr>
+            </a:br>
+            <a:br>
+              <a:rPr lang="de-CH" sz="1800" dirty="0">
+                <a:latin typeface="Arial" panose="020B0604020202020204" pitchFamily="34" charset="0"/>
+                <a:cs typeface="Arial" panose="020B0604020202020204" pitchFamily="34" charset="0"/>
+              </a:rPr>
+            </a:br>
+            <a:r>
+              <a:rPr lang="de-CH" sz="1800" dirty="0">
+                <a:latin typeface="Arial" panose="020B0604020202020204" pitchFamily="34" charset="0"/>
+                <a:cs typeface="Arial" panose="020B0604020202020204" pitchFamily="34" charset="0"/>
+              </a:rPr>
+              <a:t> #</a:t>
+            </a:r>
+            <a:r>
+              <a:rPr lang="de-CH" sz="1800" dirty="0" err="1">
+                <a:latin typeface="Arial" panose="020B0604020202020204" pitchFamily="34" charset="0"/>
+                <a:cs typeface="Arial" panose="020B0604020202020204" pitchFamily="34" charset="0"/>
+              </a:rPr>
+              <a:t>intro</a:t>
+            </a:r>
+            <a:r>
+              <a:rPr lang="de-CH" sz="1800" dirty="0">
+                <a:latin typeface="Arial" panose="020B0604020202020204" pitchFamily="34" charset="0"/>
+                <a:cs typeface="Arial" panose="020B0604020202020204" pitchFamily="34" charset="0"/>
+              </a:rPr>
+              <a:t> { </a:t>
+            </a:r>
+            <a:r>
+              <a:rPr lang="de-CH" sz="1800" dirty="0" err="1">
+                <a:latin typeface="Arial" panose="020B0604020202020204" pitchFamily="34" charset="0"/>
+                <a:cs typeface="Arial" panose="020B0604020202020204" pitchFamily="34" charset="0"/>
+              </a:rPr>
+              <a:t>color:blue</a:t>
+            </a:r>
+            <a:r>
+              <a:rPr lang="de-CH" sz="1800" dirty="0">
+                <a:latin typeface="Arial" panose="020B0604020202020204" pitchFamily="34" charset="0"/>
+                <a:cs typeface="Arial" panose="020B0604020202020204" pitchFamily="34" charset="0"/>
+              </a:rPr>
+              <a:t>; } </a:t>
+            </a:r>
+            <a:br>
+              <a:rPr lang="de-CH" sz="1800" dirty="0">
+                <a:latin typeface="Arial" panose="020B0604020202020204" pitchFamily="34" charset="0"/>
+                <a:cs typeface="Arial" panose="020B0604020202020204" pitchFamily="34" charset="0"/>
+              </a:rPr>
+            </a:br>
+            <a:r>
+              <a:rPr lang="de-CH" sz="1800" dirty="0">
+                <a:latin typeface="Arial" panose="020B0604020202020204" pitchFamily="34" charset="0"/>
+                <a:cs typeface="Arial" panose="020B0604020202020204" pitchFamily="34" charset="0"/>
+              </a:rPr>
+              <a:t>.</a:t>
+            </a:r>
+            <a:r>
+              <a:rPr lang="de-CH" sz="1800" dirty="0" err="1">
+                <a:latin typeface="Arial" panose="020B0604020202020204" pitchFamily="34" charset="0"/>
+                <a:cs typeface="Arial" panose="020B0604020202020204" pitchFamily="34" charset="0"/>
+              </a:rPr>
+              <a:t>excerpt</a:t>
+            </a:r>
+            <a:r>
+              <a:rPr lang="de-CH" sz="1800" dirty="0">
+                <a:latin typeface="Arial" panose="020B0604020202020204" pitchFamily="34" charset="0"/>
+                <a:cs typeface="Arial" panose="020B0604020202020204" pitchFamily="34" charset="0"/>
+              </a:rPr>
+              <a:t> { </a:t>
+            </a:r>
+            <a:r>
+              <a:rPr lang="de-CH" sz="1800" dirty="0" err="1">
+                <a:latin typeface="Arial" panose="020B0604020202020204" pitchFamily="34" charset="0"/>
+                <a:cs typeface="Arial" panose="020B0604020202020204" pitchFamily="34" charset="0"/>
+              </a:rPr>
+              <a:t>color:green</a:t>
+            </a:r>
+            <a:r>
+              <a:rPr lang="de-CH" sz="1800" dirty="0">
+                <a:latin typeface="Arial" panose="020B0604020202020204" pitchFamily="34" charset="0"/>
+                <a:cs typeface="Arial" panose="020B0604020202020204" pitchFamily="34" charset="0"/>
+              </a:rPr>
+              <a:t> }</a:t>
+            </a:r>
+            <a:br>
+              <a:rPr lang="de-CH" sz="1800" dirty="0">
+                <a:latin typeface="Arial" panose="020B0604020202020204" pitchFamily="34" charset="0"/>
+                <a:cs typeface="Arial" panose="020B0604020202020204" pitchFamily="34" charset="0"/>
+              </a:rPr>
+            </a:br>
+            <a:r>
+              <a:rPr lang="de-CH" sz="1800" dirty="0">
+                <a:latin typeface="Arial" panose="020B0604020202020204" pitchFamily="34" charset="0"/>
+                <a:cs typeface="Arial" panose="020B0604020202020204" pitchFamily="34" charset="0"/>
+              </a:rPr>
+              <a:t> p { </a:t>
+            </a:r>
+            <a:r>
+              <a:rPr lang="de-CH" sz="1800" dirty="0" err="1">
+                <a:latin typeface="Arial" panose="020B0604020202020204" pitchFamily="34" charset="0"/>
+                <a:cs typeface="Arial" panose="020B0604020202020204" pitchFamily="34" charset="0"/>
+              </a:rPr>
+              <a:t>color:red</a:t>
+            </a:r>
+            <a:r>
+              <a:rPr lang="de-CH" sz="1800" dirty="0">
+                <a:latin typeface="Arial" panose="020B0604020202020204" pitchFamily="34" charset="0"/>
+                <a:cs typeface="Arial" panose="020B0604020202020204" pitchFamily="34" charset="0"/>
+              </a:rPr>
+              <a:t>; }</a:t>
+            </a:r>
+            <a:endParaRPr lang="en-US" sz="1800" dirty="0">
+              <a:effectLst/>
+              <a:latin typeface="Arial" panose="020B0604020202020204" pitchFamily="34" charset="0"/>
+              <a:cs typeface="Arial" panose="020B0604020202020204" pitchFamily="34" charset="0"/>
+            </a:endParaRPr>
+          </a:p>
+        </p:txBody>
+      </p:sp>
+      <p:sp>
+        <p:nvSpPr>
+          <p:cNvPr id="5" name="Textfeld 4">
+            <a:extLst>
+              <a:ext uri="{FF2B5EF4-FFF2-40B4-BE49-F238E27FC236}">
+                <a16:creationId xmlns:a16="http://schemas.microsoft.com/office/drawing/2014/main" id="{4F46F19C-1BBE-094C-BB9A-9254BD2F0084}"/>
+              </a:ext>
+            </a:extLst>
+          </p:cNvPr>
+          <p:cNvSpPr txBox="1"/>
+          <p:nvPr/>
+        </p:nvSpPr>
+        <p:spPr>
+          <a:xfrm>
+            <a:off x="1262899" y="4289275"/>
+            <a:ext cx="3429144" cy="646331"/>
+          </a:xfrm>
+          <a:prstGeom prst="rect">
+            <a:avLst/>
+          </a:prstGeom>
+          <a:noFill/>
+        </p:spPr>
+        <p:txBody>
+          <a:bodyPr wrap="none" rtlCol="0">
+            <a:spAutoFit/>
+          </a:bodyPr>
+          <a:lstStyle/>
+          <a:p>
+            <a:r>
+              <a:rPr lang="de-DE" dirty="0"/>
+              <a:t>Welche Farbe hat</a:t>
+            </a:r>
+            <a:br>
+              <a:rPr lang="de-DE" dirty="0"/>
+            </a:br>
+            <a:r>
+              <a:rPr lang="de-DE" dirty="0"/>
+              <a:t>„</a:t>
+            </a:r>
+            <a:r>
+              <a:rPr lang="de-CH" dirty="0">
+                <a:latin typeface="Arial" panose="020B0604020202020204" pitchFamily="34" charset="0"/>
+                <a:cs typeface="Arial" panose="020B0604020202020204" pitchFamily="34" charset="0"/>
+              </a:rPr>
+              <a:t> </a:t>
+            </a:r>
+            <a:r>
+              <a:rPr lang="de-CH" dirty="0" err="1">
+                <a:latin typeface="Arial" panose="020B0604020202020204" pitchFamily="34" charset="0"/>
+                <a:cs typeface="Arial" panose="020B0604020202020204" pitchFamily="34" charset="0"/>
+              </a:rPr>
+              <a:t>Lorem</a:t>
+            </a:r>
+            <a:r>
+              <a:rPr lang="de-CH" dirty="0">
+                <a:latin typeface="Arial" panose="020B0604020202020204" pitchFamily="34" charset="0"/>
+                <a:cs typeface="Arial" panose="020B0604020202020204" pitchFamily="34" charset="0"/>
+              </a:rPr>
+              <a:t> </a:t>
+            </a:r>
+            <a:r>
+              <a:rPr lang="de-CH" dirty="0" err="1">
+                <a:latin typeface="Arial" panose="020B0604020202020204" pitchFamily="34" charset="0"/>
+                <a:cs typeface="Arial" panose="020B0604020202020204" pitchFamily="34" charset="0"/>
+              </a:rPr>
+              <a:t>ipsum</a:t>
+            </a:r>
+            <a:r>
+              <a:rPr lang="de-CH" dirty="0">
+                <a:latin typeface="Arial" panose="020B0604020202020204" pitchFamily="34" charset="0"/>
+                <a:cs typeface="Arial" panose="020B0604020202020204" pitchFamily="34" charset="0"/>
+              </a:rPr>
+              <a:t> </a:t>
+            </a:r>
+            <a:r>
+              <a:rPr lang="de-CH" dirty="0" err="1">
+                <a:latin typeface="Arial" panose="020B0604020202020204" pitchFamily="34" charset="0"/>
+                <a:cs typeface="Arial" panose="020B0604020202020204" pitchFamily="34" charset="0"/>
+              </a:rPr>
+              <a:t>dolor</a:t>
+            </a:r>
+            <a:r>
+              <a:rPr lang="de-CH" dirty="0">
+                <a:latin typeface="Arial" panose="020B0604020202020204" pitchFamily="34" charset="0"/>
+                <a:cs typeface="Arial" panose="020B0604020202020204" pitchFamily="34" charset="0"/>
+              </a:rPr>
+              <a:t> </a:t>
+            </a:r>
+            <a:r>
+              <a:rPr lang="de-CH" dirty="0" err="1">
+                <a:latin typeface="Arial" panose="020B0604020202020204" pitchFamily="34" charset="0"/>
+                <a:cs typeface="Arial" panose="020B0604020202020204" pitchFamily="34" charset="0"/>
+              </a:rPr>
+              <a:t>sit</a:t>
+            </a:r>
+            <a:r>
+              <a:rPr lang="de-CH" dirty="0">
+                <a:latin typeface="Arial" panose="020B0604020202020204" pitchFamily="34" charset="0"/>
+                <a:cs typeface="Arial" panose="020B0604020202020204" pitchFamily="34" charset="0"/>
+              </a:rPr>
+              <a:t> </a:t>
+            </a:r>
+            <a:r>
+              <a:rPr lang="de-CH" dirty="0" err="1">
+                <a:latin typeface="Arial" panose="020B0604020202020204" pitchFamily="34" charset="0"/>
+                <a:cs typeface="Arial" panose="020B0604020202020204" pitchFamily="34" charset="0"/>
+              </a:rPr>
+              <a:t>amet</a:t>
+            </a:r>
+            <a:r>
+              <a:rPr lang="de-DE" dirty="0"/>
+              <a:t>“ ?</a:t>
+            </a:r>
           </a:p>
         </p:txBody>
       </p:sp>

</xml_diff>

<commit_message>
mixin content plus Übung dazu hinzugefügt.
</commit_message>
<xml_diff>
--- a/htmlSchulung.pptx
+++ b/htmlSchulung.pptx
@@ -31146,19 +31146,20 @@
               <a:rPr lang="en-US" dirty="0"/>
               <a:t>.</a:t>
             </a:r>
-          </a:p>
-          <a:p>
+            <a:br>
+              <a:rPr lang="en-US" dirty="0"/>
+            </a:br>
+            <a:endParaRPr lang="en-US" dirty="0"/>
+          </a:p>
+          <a:p>
+            <a:pPr marL="0" indent="0">
+              <a:buNone/>
+            </a:pPr>
             <a:r>
               <a:rPr lang="en-US" dirty="0">
                 <a:hlinkClick r:id="rId2"/>
               </a:rPr>
-              <a:t>https://medium.freecodecamp.org</a:t>
-            </a:r>
-            <a:r>
-              <a:rPr lang="en-US">
-                <a:hlinkClick r:id="rId2"/>
-              </a:rPr>
-              <a:t>/how-to-understand-css-position-absolute-once-and-for-all-b71ca10cd3fd</a:t>
+              <a:t>https://medium.freecodecamp.org/how-to-understand-css-position-absolute-once-and-for-all-b71ca10cd3fd</a:t>
             </a:r>
             <a:endParaRPr lang="en-US" dirty="0"/>
           </a:p>
@@ -31514,7 +31515,9 @@
         </p:nvSpPr>
         <p:spPr/>
         <p:txBody>
-          <a:bodyPr/>
+          <a:bodyPr>
+            <a:normAutofit fontScale="92500" lnSpcReduction="10000"/>
+          </a:bodyPr>
           <a:lstStyle/>
           <a:p>
             <a:r>
@@ -31799,6 +31802,32 @@
               </a:rPr>
               <a:t>}</a:t>
             </a:r>
+          </a:p>
+          <a:p>
+            <a:pPr marL="0" indent="0">
+              <a:buNone/>
+            </a:pPr>
+            <a:endParaRPr lang="de-DE" sz="1800" dirty="0">
+              <a:latin typeface="Arial" panose="020B0604020202020204" pitchFamily="34" charset="0"/>
+              <a:cs typeface="Arial" panose="020B0604020202020204" pitchFamily="34" charset="0"/>
+            </a:endParaRPr>
+          </a:p>
+          <a:p>
+            <a:pPr marL="0" indent="0">
+              <a:buNone/>
+            </a:pPr>
+            <a:r>
+              <a:rPr lang="de-DE" sz="1800" dirty="0">
+                <a:latin typeface="Arial" panose="020B0604020202020204" pitchFamily="34" charset="0"/>
+                <a:cs typeface="Arial" panose="020B0604020202020204" pitchFamily="34" charset="0"/>
+                <a:hlinkClick r:id="rId2"/>
+              </a:rPr>
+              <a:t>https://css-tricks.com/snippets/css/media-queries-for-standard-devices/</a:t>
+            </a:r>
+            <a:endParaRPr lang="de-DE" sz="1800" dirty="0">
+              <a:latin typeface="Arial" panose="020B0604020202020204" pitchFamily="34" charset="0"/>
+              <a:cs typeface="Arial" panose="020B0604020202020204" pitchFamily="34" charset="0"/>
+            </a:endParaRPr>
           </a:p>
         </p:txBody>
       </p:sp>

</xml_diff>

<commit_message>
Links ergänzt, nach der letzten Schulungssession
</commit_message>
<xml_diff>
--- a/htmlSchulung.pptx
+++ b/htmlSchulung.pptx
@@ -330,7 +330,7 @@
           <a:p>
             <a:fld id="{BE2D71F2-CD9B-7C46-8D66-54734C07EE34}" type="datetimeFigureOut">
               <a:rPr lang="de-DE" smtClean="0"/>
-              <a:t>03.04.19</a:t>
+              <a:t>09.04.19</a:t>
             </a:fld>
             <a:endParaRPr lang="de-DE"/>
           </a:p>
@@ -463,7 +463,7 @@
           <a:p>
             <a:fld id="{60940F8C-0819-D64A-BC61-6EB4B2E2912A}" type="slidenum">
               <a:rPr lang="de-DE" smtClean="0"/>
-              <a:t>‹Nr.›</a:t>
+              <a:t>‹#›</a:t>
             </a:fld>
             <a:endParaRPr lang="de-DE"/>
           </a:p>
@@ -1518,7 +1518,7 @@
           <a:p>
             <a:fld id="{97F8442F-7EFF-D846-8D33-E60C8BAB8488}" type="datetimeFigureOut">
               <a:rPr lang="de-DE" smtClean="0"/>
-              <a:t>03.04.19</a:t>
+              <a:t>09.04.19</a:t>
             </a:fld>
             <a:endParaRPr lang="de-DE"/>
           </a:p>
@@ -1565,7 +1565,7 @@
           <a:p>
             <a:fld id="{D90341C6-B83F-F944-B0DF-A5D91789E42C}" type="slidenum">
               <a:rPr lang="de-DE" smtClean="0"/>
-              <a:t>‹Nr.›</a:t>
+              <a:t>‹#›</a:t>
             </a:fld>
             <a:endParaRPr lang="de-DE"/>
           </a:p>
@@ -1937,7 +1937,7 @@
           <a:p>
             <a:fld id="{97F8442F-7EFF-D846-8D33-E60C8BAB8488}" type="datetimeFigureOut">
               <a:rPr lang="de-DE" smtClean="0"/>
-              <a:t>03.04.19</a:t>
+              <a:t>09.04.19</a:t>
             </a:fld>
             <a:endParaRPr lang="de-DE"/>
           </a:p>
@@ -1984,7 +1984,7 @@
           <a:p>
             <a:fld id="{D90341C6-B83F-F944-B0DF-A5D91789E42C}" type="slidenum">
               <a:rPr lang="de-DE" smtClean="0"/>
-              <a:t>‹Nr.›</a:t>
+              <a:t>‹#›</a:t>
             </a:fld>
             <a:endParaRPr lang="de-DE"/>
           </a:p>
@@ -2278,7 +2278,7 @@
           <a:p>
             <a:fld id="{97F8442F-7EFF-D846-8D33-E60C8BAB8488}" type="datetimeFigureOut">
               <a:rPr lang="de-DE" smtClean="0"/>
-              <a:t>03.04.19</a:t>
+              <a:t>09.04.19</a:t>
             </a:fld>
             <a:endParaRPr lang="de-DE"/>
           </a:p>
@@ -2325,7 +2325,7 @@
           <a:p>
             <a:fld id="{D90341C6-B83F-F944-B0DF-A5D91789E42C}" type="slidenum">
               <a:rPr lang="de-DE" smtClean="0"/>
-              <a:t>‹Nr.›</a:t>
+              <a:t>‹#›</a:t>
             </a:fld>
             <a:endParaRPr lang="de-DE"/>
           </a:p>
@@ -2693,7 +2693,7 @@
           <a:p>
             <a:fld id="{97F8442F-7EFF-D846-8D33-E60C8BAB8488}" type="datetimeFigureOut">
               <a:rPr lang="de-DE" smtClean="0"/>
-              <a:t>03.04.19</a:t>
+              <a:t>09.04.19</a:t>
             </a:fld>
             <a:endParaRPr lang="de-DE"/>
           </a:p>
@@ -2740,7 +2740,7 @@
           <a:p>
             <a:fld id="{D90341C6-B83F-F944-B0DF-A5D91789E42C}" type="slidenum">
               <a:rPr lang="de-DE" smtClean="0"/>
-              <a:t>‹Nr.›</a:t>
+              <a:t>‹#›</a:t>
             </a:fld>
             <a:endParaRPr lang="de-DE"/>
           </a:p>
@@ -3266,7 +3266,7 @@
           <a:p>
             <a:fld id="{97F8442F-7EFF-D846-8D33-E60C8BAB8488}" type="datetimeFigureOut">
               <a:rPr lang="de-DE" smtClean="0"/>
-              <a:t>03.04.19</a:t>
+              <a:t>09.04.19</a:t>
             </a:fld>
             <a:endParaRPr lang="de-DE"/>
           </a:p>
@@ -3313,7 +3313,7 @@
           <a:p>
             <a:fld id="{D90341C6-B83F-F944-B0DF-A5D91789E42C}" type="slidenum">
               <a:rPr lang="de-DE" smtClean="0"/>
-              <a:t>‹Nr.›</a:t>
+              <a:t>‹#›</a:t>
             </a:fld>
             <a:endParaRPr lang="de-DE"/>
           </a:p>
@@ -3977,7 +3977,7 @@
           <a:p>
             <a:fld id="{97F8442F-7EFF-D846-8D33-E60C8BAB8488}" type="datetimeFigureOut">
               <a:rPr lang="de-DE" smtClean="0"/>
-              <a:t>03.04.19</a:t>
+              <a:t>09.04.19</a:t>
             </a:fld>
             <a:endParaRPr lang="de-DE"/>
           </a:p>
@@ -4019,7 +4019,7 @@
           <a:p>
             <a:fld id="{D90341C6-B83F-F944-B0DF-A5D91789E42C}" type="slidenum">
               <a:rPr lang="de-DE" smtClean="0"/>
-              <a:t>‹Nr.›</a:t>
+              <a:t>‹#›</a:t>
             </a:fld>
             <a:endParaRPr lang="de-DE"/>
           </a:p>
@@ -4920,7 +4920,7 @@
           <a:p>
             <a:fld id="{97F8442F-7EFF-D846-8D33-E60C8BAB8488}" type="datetimeFigureOut">
               <a:rPr lang="de-DE" smtClean="0"/>
-              <a:t>03.04.19</a:t>
+              <a:t>09.04.19</a:t>
             </a:fld>
             <a:endParaRPr lang="de-DE"/>
           </a:p>
@@ -4962,7 +4962,7 @@
           <a:p>
             <a:fld id="{D90341C6-B83F-F944-B0DF-A5D91789E42C}" type="slidenum">
               <a:rPr lang="de-DE" smtClean="0"/>
-              <a:t>‹Nr.›</a:t>
+              <a:t>‹#›</a:t>
             </a:fld>
             <a:endParaRPr lang="de-DE"/>
           </a:p>
@@ -5209,7 +5209,7 @@
           <a:p>
             <a:fld id="{97F8442F-7EFF-D846-8D33-E60C8BAB8488}" type="datetimeFigureOut">
               <a:rPr lang="de-DE" smtClean="0"/>
-              <a:t>03.04.19</a:t>
+              <a:t>09.04.19</a:t>
             </a:fld>
             <a:endParaRPr lang="de-DE"/>
           </a:p>
@@ -5251,7 +5251,7 @@
           <a:p>
             <a:fld id="{D90341C6-B83F-F944-B0DF-A5D91789E42C}" type="slidenum">
               <a:rPr lang="de-DE" smtClean="0"/>
-              <a:t>‹Nr.›</a:t>
+              <a:t>‹#›</a:t>
             </a:fld>
             <a:endParaRPr lang="de-DE"/>
           </a:p>
@@ -5449,7 +5449,7 @@
           <a:p>
             <a:fld id="{97F8442F-7EFF-D846-8D33-E60C8BAB8488}" type="datetimeFigureOut">
               <a:rPr lang="de-DE" smtClean="0"/>
-              <a:t>03.04.19</a:t>
+              <a:t>09.04.19</a:t>
             </a:fld>
             <a:endParaRPr lang="de-DE"/>
           </a:p>
@@ -5505,7 +5505,7 @@
           <a:p>
             <a:fld id="{D90341C6-B83F-F944-B0DF-A5D91789E42C}" type="slidenum">
               <a:rPr lang="de-DE" smtClean="0"/>
-              <a:t>‹Nr.›</a:t>
+              <a:t>‹#›</a:t>
             </a:fld>
             <a:endParaRPr lang="de-DE"/>
           </a:p>
@@ -5748,7 +5748,7 @@
           <a:p>
             <a:fld id="{97F8442F-7EFF-D846-8D33-E60C8BAB8488}" type="datetimeFigureOut">
               <a:rPr lang="de-DE" smtClean="0"/>
-              <a:t>03.04.19</a:t>
+              <a:t>09.04.19</a:t>
             </a:fld>
             <a:endParaRPr lang="de-DE"/>
           </a:p>
@@ -5790,7 +5790,7 @@
           <a:p>
             <a:fld id="{D90341C6-B83F-F944-B0DF-A5D91789E42C}" type="slidenum">
               <a:rPr lang="de-DE" smtClean="0"/>
-              <a:t>‹Nr.›</a:t>
+              <a:t>‹#›</a:t>
             </a:fld>
             <a:endParaRPr lang="de-DE"/>
           </a:p>
@@ -6142,7 +6142,7 @@
           <a:p>
             <a:fld id="{97F8442F-7EFF-D846-8D33-E60C8BAB8488}" type="datetimeFigureOut">
               <a:rPr lang="de-DE" smtClean="0"/>
-              <a:t>03.04.19</a:t>
+              <a:t>09.04.19</a:t>
             </a:fld>
             <a:endParaRPr lang="de-DE"/>
           </a:p>
@@ -6189,7 +6189,7 @@
           <a:p>
             <a:fld id="{D90341C6-B83F-F944-B0DF-A5D91789E42C}" type="slidenum">
               <a:rPr lang="de-DE" smtClean="0"/>
-              <a:t>‹Nr.›</a:t>
+              <a:t>‹#›</a:t>
             </a:fld>
             <a:endParaRPr lang="de-DE"/>
           </a:p>
@@ -6470,7 +6470,7 @@
           <a:p>
             <a:fld id="{97F8442F-7EFF-D846-8D33-E60C8BAB8488}" type="datetimeFigureOut">
               <a:rPr lang="de-DE" smtClean="0"/>
-              <a:t>03.04.19</a:t>
+              <a:t>09.04.19</a:t>
             </a:fld>
             <a:endParaRPr lang="de-DE"/>
           </a:p>
@@ -6512,7 +6512,7 @@
           <a:p>
             <a:fld id="{D90341C6-B83F-F944-B0DF-A5D91789E42C}" type="slidenum">
               <a:rPr lang="de-DE" smtClean="0"/>
-              <a:t>‹Nr.›</a:t>
+              <a:t>‹#›</a:t>
             </a:fld>
             <a:endParaRPr lang="de-DE"/>
           </a:p>
@@ -6938,7 +6938,7 @@
           <a:p>
             <a:fld id="{97F8442F-7EFF-D846-8D33-E60C8BAB8488}" type="datetimeFigureOut">
               <a:rPr lang="de-DE" smtClean="0"/>
-              <a:t>03.04.19</a:t>
+              <a:t>09.04.19</a:t>
             </a:fld>
             <a:endParaRPr lang="de-DE"/>
           </a:p>
@@ -6980,7 +6980,7 @@
           <a:p>
             <a:fld id="{D90341C6-B83F-F944-B0DF-A5D91789E42C}" type="slidenum">
               <a:rPr lang="de-DE" smtClean="0"/>
-              <a:t>‹Nr.›</a:t>
+              <a:t>‹#›</a:t>
             </a:fld>
             <a:endParaRPr lang="de-DE"/>
           </a:p>
@@ -7195,7 +7195,7 @@
           <a:p>
             <a:fld id="{97F8442F-7EFF-D846-8D33-E60C8BAB8488}" type="datetimeFigureOut">
               <a:rPr lang="de-DE" smtClean="0"/>
-              <a:t>03.04.19</a:t>
+              <a:t>09.04.19</a:t>
             </a:fld>
             <a:endParaRPr lang="de-DE"/>
           </a:p>
@@ -7237,7 +7237,7 @@
           <a:p>
             <a:fld id="{D90341C6-B83F-F944-B0DF-A5D91789E42C}" type="slidenum">
               <a:rPr lang="de-DE" smtClean="0"/>
-              <a:t>‹Nr.›</a:t>
+              <a:t>‹#›</a:t>
             </a:fld>
             <a:endParaRPr lang="de-DE"/>
           </a:p>
@@ -7358,7 +7358,7 @@
           <a:p>
             <a:fld id="{97F8442F-7EFF-D846-8D33-E60C8BAB8488}" type="datetimeFigureOut">
               <a:rPr lang="de-DE" smtClean="0"/>
-              <a:t>03.04.19</a:t>
+              <a:t>09.04.19</a:t>
             </a:fld>
             <a:endParaRPr lang="de-DE"/>
           </a:p>
@@ -7400,7 +7400,7 @@
           <a:p>
             <a:fld id="{D90341C6-B83F-F944-B0DF-A5D91789E42C}" type="slidenum">
               <a:rPr lang="de-DE" smtClean="0"/>
-              <a:t>‹Nr.›</a:t>
+              <a:t>‹#›</a:t>
             </a:fld>
             <a:endParaRPr lang="de-DE"/>
           </a:p>
@@ -7729,7 +7729,7 @@
           <a:p>
             <a:fld id="{97F8442F-7EFF-D846-8D33-E60C8BAB8488}" type="datetimeFigureOut">
               <a:rPr lang="de-DE" smtClean="0"/>
-              <a:t>03.04.19</a:t>
+              <a:t>09.04.19</a:t>
             </a:fld>
             <a:endParaRPr lang="de-DE"/>
           </a:p>
@@ -7771,7 +7771,7 @@
           <a:p>
             <a:fld id="{D90341C6-B83F-F944-B0DF-A5D91789E42C}" type="slidenum">
               <a:rPr lang="de-DE" smtClean="0"/>
-              <a:t>‹Nr.›</a:t>
+              <a:t>‹#›</a:t>
             </a:fld>
             <a:endParaRPr lang="de-DE"/>
           </a:p>
@@ -8143,7 +8143,7 @@
           <a:p>
             <a:fld id="{97F8442F-7EFF-D846-8D33-E60C8BAB8488}" type="datetimeFigureOut">
               <a:rPr lang="de-DE" smtClean="0"/>
-              <a:t>03.04.19</a:t>
+              <a:t>09.04.19</a:t>
             </a:fld>
             <a:endParaRPr lang="de-DE"/>
           </a:p>
@@ -8185,7 +8185,7 @@
           <a:p>
             <a:fld id="{D90341C6-B83F-F944-B0DF-A5D91789E42C}" type="slidenum">
               <a:rPr lang="de-DE" smtClean="0"/>
-              <a:t>‹Nr.›</a:t>
+              <a:t>‹#›</a:t>
             </a:fld>
             <a:endParaRPr lang="de-DE"/>
           </a:p>
@@ -8363,7 +8363,7 @@
           <a:p>
             <a:fld id="{97F8442F-7EFF-D846-8D33-E60C8BAB8488}" type="datetimeFigureOut">
               <a:rPr lang="de-DE" smtClean="0"/>
-              <a:t>03.04.19</a:t>
+              <a:t>09.04.19</a:t>
             </a:fld>
             <a:endParaRPr lang="de-DE"/>
           </a:p>
@@ -8441,7 +8441,7 @@
           <a:p>
             <a:fld id="{D90341C6-B83F-F944-B0DF-A5D91789E42C}" type="slidenum">
               <a:rPr lang="de-DE" smtClean="0"/>
-              <a:t>‹Nr.›</a:t>
+              <a:t>‹#›</a:t>
             </a:fld>
             <a:endParaRPr lang="de-DE"/>
           </a:p>
@@ -12780,6 +12780,81 @@
                 <a:hlinkClick r:id="rId6"/>
               </a:rPr>
               <a:t>https://devdocs.io/</a:t>
+            </a:r>
+            <a:br>
+              <a:rPr lang="de-DE" dirty="0"/>
+            </a:br>
+            <a:br>
+              <a:rPr lang="de-DE" dirty="0"/>
+            </a:br>
+            <a:r>
+              <a:rPr lang="en-US" dirty="0"/>
+              <a:t>Die </a:t>
+            </a:r>
+            <a:r>
+              <a:rPr lang="en-US" dirty="0" err="1"/>
+              <a:t>Übungen</a:t>
+            </a:r>
+            <a:r>
+              <a:rPr lang="en-US" dirty="0"/>
+              <a:t> und </a:t>
+            </a:r>
+            <a:r>
+              <a:rPr lang="en-US" dirty="0" err="1"/>
+              <a:t>diese</a:t>
+            </a:r>
+            <a:r>
+              <a:rPr lang="en-US" dirty="0"/>
+              <a:t> </a:t>
+            </a:r>
+            <a:r>
+              <a:rPr lang="en-US" dirty="0" err="1"/>
+              <a:t>Präsentation</a:t>
+            </a:r>
+            <a:r>
+              <a:rPr lang="en-US" dirty="0"/>
+              <a:t> </a:t>
+            </a:r>
+            <a:r>
+              <a:rPr lang="en-US" dirty="0" err="1"/>
+              <a:t>sind</a:t>
+            </a:r>
+            <a:r>
+              <a:rPr lang="en-US" dirty="0"/>
+              <a:t> </a:t>
+            </a:r>
+            <a:r>
+              <a:rPr lang="en-US" dirty="0" err="1"/>
+              <a:t>zu</a:t>
+            </a:r>
+            <a:r>
+              <a:rPr lang="en-US" dirty="0"/>
+              <a:t> </a:t>
+            </a:r>
+            <a:r>
+              <a:rPr lang="en-US" dirty="0" err="1"/>
+              <a:t>finden</a:t>
+            </a:r>
+            <a:r>
+              <a:rPr lang="en-US" dirty="0"/>
+              <a:t> </a:t>
+            </a:r>
+            <a:r>
+              <a:rPr lang="en-US" dirty="0" err="1"/>
+              <a:t>unter</a:t>
+            </a:r>
+            <a:r>
+              <a:rPr lang="en-US" dirty="0"/>
+              <a:t>:</a:t>
+            </a:r>
+            <a:br>
+              <a:rPr lang="en-US" dirty="0"/>
+            </a:br>
+            <a:r>
+              <a:rPr lang="en-US" dirty="0">
+                <a:hlinkClick r:id="rId7"/>
+              </a:rPr>
+              <a:t>https://github.com/TomFrey/htmlCssBasicUebungen</a:t>
             </a:r>
             <a:endParaRPr lang="de-DE" dirty="0"/>
           </a:p>

</xml_diff>